<commit_message>
Made Changes to PPTX
</commit_message>
<xml_diff>
--- a/doc/Crypto_Final_Presentation.pptx
+++ b/doc/Crypto_Final_Presentation.pptx
@@ -5,29 +5,30 @@
     <p:sldMasterId id="2147483660" r:id="rId1"/>
   </p:sldMasterIdLst>
   <p:notesMasterIdLst>
-    <p:notesMasterId r:id="rId19"/>
+    <p:notesMasterId r:id="rId20"/>
   </p:notesMasterIdLst>
   <p:handoutMasterIdLst>
-    <p:handoutMasterId r:id="rId20"/>
+    <p:handoutMasterId r:id="rId21"/>
   </p:handoutMasterIdLst>
   <p:sldIdLst>
     <p:sldId id="256" r:id="rId2"/>
     <p:sldId id="257" r:id="rId3"/>
-    <p:sldId id="258" r:id="rId4"/>
-    <p:sldId id="259" r:id="rId5"/>
-    <p:sldId id="263" r:id="rId6"/>
-    <p:sldId id="260" r:id="rId7"/>
-    <p:sldId id="261" r:id="rId8"/>
-    <p:sldId id="262" r:id="rId9"/>
-    <p:sldId id="271" r:id="rId10"/>
-    <p:sldId id="272" r:id="rId11"/>
-    <p:sldId id="267" r:id="rId12"/>
-    <p:sldId id="264" r:id="rId13"/>
-    <p:sldId id="265" r:id="rId14"/>
+    <p:sldId id="273" r:id="rId4"/>
+    <p:sldId id="258" r:id="rId5"/>
+    <p:sldId id="259" r:id="rId6"/>
+    <p:sldId id="263" r:id="rId7"/>
+    <p:sldId id="260" r:id="rId8"/>
+    <p:sldId id="261" r:id="rId9"/>
+    <p:sldId id="262" r:id="rId10"/>
+    <p:sldId id="271" r:id="rId11"/>
+    <p:sldId id="272" r:id="rId12"/>
+    <p:sldId id="267" r:id="rId13"/>
+    <p:sldId id="264" r:id="rId14"/>
     <p:sldId id="266" r:id="rId15"/>
     <p:sldId id="268" r:id="rId16"/>
     <p:sldId id="269" r:id="rId17"/>
     <p:sldId id="270" r:id="rId18"/>
+    <p:sldId id="265" r:id="rId19"/>
   </p:sldIdLst>
   <p:sldSz cx="12192000" cy="6858000"/>
   <p:notesSz cx="6858000" cy="9144000"/>
@@ -216,7 +217,7 @@
           <a:p>
             <a:fld id="{DBF0A504-8D30-45BB-8D29-F7BF444A4C1E}" type="datetimeFigureOut">
               <a:rPr lang="en-US" smtClean="0"/>
-              <a:t>12/18/2016</a:t>
+              <a:t>12/19/2016</a:t>
             </a:fld>
             <a:endParaRPr lang="en-US"/>
           </a:p>
@@ -382,7 +383,7 @@
           <a:p>
             <a:fld id="{BA443B5A-046E-4325-A058-2C61FA8B0430}" type="datetimeFigureOut">
               <a:rPr lang="en-US" smtClean="0"/>
-              <a:t>12/18/2016</a:t>
+              <a:t>12/19/2016</a:t>
             </a:fld>
             <a:endParaRPr lang="en-US"/>
           </a:p>
@@ -819,7 +820,7 @@
           <a:p>
             <a:fld id="{16F9FCAB-75CB-418E-A87B-2EA497AA5328}" type="datetimeFigureOut">
               <a:rPr lang="en-US" smtClean="0"/>
-              <a:t>12/18/2016</a:t>
+              <a:t>12/19/2016</a:t>
             </a:fld>
             <a:endParaRPr lang="en-US"/>
           </a:p>
@@ -1149,7 +1150,7 @@
           <a:p>
             <a:fld id="{16F9FCAB-75CB-418E-A87B-2EA497AA5328}" type="datetimeFigureOut">
               <a:rPr lang="en-US" smtClean="0"/>
-              <a:t>12/18/2016</a:t>
+              <a:t>12/19/2016</a:t>
             </a:fld>
             <a:endParaRPr lang="en-US"/>
           </a:p>
@@ -1329,7 +1330,7 @@
           <a:p>
             <a:fld id="{16F9FCAB-75CB-418E-A87B-2EA497AA5328}" type="datetimeFigureOut">
               <a:rPr lang="en-US" smtClean="0"/>
-              <a:t>12/18/2016</a:t>
+              <a:t>12/19/2016</a:t>
             </a:fld>
             <a:endParaRPr lang="en-US"/>
           </a:p>
@@ -1499,7 +1500,7 @@
           <a:p>
             <a:fld id="{16F9FCAB-75CB-418E-A87B-2EA497AA5328}" type="datetimeFigureOut">
               <a:rPr lang="en-US" smtClean="0"/>
-              <a:t>12/18/2016</a:t>
+              <a:t>12/19/2016</a:t>
             </a:fld>
             <a:endParaRPr lang="en-US"/>
           </a:p>
@@ -1776,7 +1777,7 @@
           <a:p>
             <a:fld id="{16F9FCAB-75CB-418E-A87B-2EA497AA5328}" type="datetimeFigureOut">
               <a:rPr lang="en-US" smtClean="0"/>
-              <a:t>12/18/2016</a:t>
+              <a:t>12/19/2016</a:t>
             </a:fld>
             <a:endParaRPr lang="en-US"/>
           </a:p>
@@ -2170,7 +2171,7 @@
           <a:p>
             <a:fld id="{16F9FCAB-75CB-418E-A87B-2EA497AA5328}" type="datetimeFigureOut">
               <a:rPr lang="en-US" smtClean="0"/>
-              <a:t>12/18/2016</a:t>
+              <a:t>12/19/2016</a:t>
             </a:fld>
             <a:endParaRPr lang="en-US"/>
           </a:p>
@@ -2647,7 +2648,7 @@
           <a:p>
             <a:fld id="{16F9FCAB-75CB-418E-A87B-2EA497AA5328}" type="datetimeFigureOut">
               <a:rPr lang="en-US" smtClean="0"/>
-              <a:t>12/18/2016</a:t>
+              <a:t>12/19/2016</a:t>
             </a:fld>
             <a:endParaRPr lang="en-US"/>
           </a:p>
@@ -2765,7 +2766,7 @@
           <a:p>
             <a:fld id="{16F9FCAB-75CB-418E-A87B-2EA497AA5328}" type="datetimeFigureOut">
               <a:rPr lang="en-US" smtClean="0"/>
-              <a:t>12/18/2016</a:t>
+              <a:t>12/19/2016</a:t>
             </a:fld>
             <a:endParaRPr lang="en-US"/>
           </a:p>
@@ -2860,7 +2861,7 @@
           <a:p>
             <a:fld id="{16F9FCAB-75CB-418E-A87B-2EA497AA5328}" type="datetimeFigureOut">
               <a:rPr lang="en-US" smtClean="0"/>
-              <a:t>12/18/2016</a:t>
+              <a:t>12/19/2016</a:t>
             </a:fld>
             <a:endParaRPr lang="en-US"/>
           </a:p>
@@ -3206,7 +3207,7 @@
           <a:p>
             <a:fld id="{16F9FCAB-75CB-418E-A87B-2EA497AA5328}" type="datetimeFigureOut">
               <a:rPr lang="en-US" smtClean="0"/>
-              <a:t>12/18/2016</a:t>
+              <a:t>12/19/2016</a:t>
             </a:fld>
             <a:endParaRPr lang="en-US"/>
           </a:p>
@@ -3594,7 +3595,7 @@
           <a:p>
             <a:fld id="{16F9FCAB-75CB-418E-A87B-2EA497AA5328}" type="datetimeFigureOut">
               <a:rPr lang="en-US" smtClean="0"/>
-              <a:t>12/18/2016</a:t>
+              <a:t>12/19/2016</a:t>
             </a:fld>
             <a:endParaRPr lang="en-US"/>
           </a:p>
@@ -3872,7 +3873,7 @@
           <a:p>
             <a:fld id="{16F9FCAB-75CB-418E-A87B-2EA497AA5328}" type="datetimeFigureOut">
               <a:rPr lang="en-US" smtClean="0"/>
-              <a:t>12/18/2016</a:t>
+              <a:t>12/19/2016</a:t>
             </a:fld>
             <a:endParaRPr lang="en-US"/>
           </a:p>
@@ -4497,7 +4498,7 @@
             <a:pPr algn="ctr"/>
             <a:r>
               <a:rPr lang="en-US" dirty="0"/>
-              <a:t>Tallying Phase</a:t>
+              <a:t>Vote Casting Phase</a:t>
             </a:r>
           </a:p>
         </p:txBody>
@@ -4519,14 +4520,14 @@
           <a:p>
             <a:r>
               <a:rPr lang="en-US" dirty="0"/>
-              <a:t>Vote is only tallied after the hash is verified</a:t>
-            </a:r>
-          </a:p>
-          <a:p>
-            <a:pPr marL="0" indent="0">
-              <a:buNone/>
-            </a:pPr>
-            <a:endParaRPr lang="en-US" dirty="0"/>
+              <a:t>Votes are sent over an encrypted channel</a:t>
+            </a:r>
+          </a:p>
+          <a:p>
+            <a:r>
+              <a:rPr lang="en-US" dirty="0"/>
+              <a:t>Encrypted Votes are hashed.</a:t>
+            </a:r>
           </a:p>
           <a:p>
             <a:pPr marL="0" indent="0">
@@ -4558,7 +4559,7 @@
     </p:spTree>
     <p:extLst>
       <p:ext uri="{BB962C8B-B14F-4D97-AF65-F5344CB8AC3E}">
-        <p14:creationId xmlns:p14="http://schemas.microsoft.com/office/powerpoint/2010/main" val="279905248"/>
+        <p14:creationId xmlns:p14="http://schemas.microsoft.com/office/powerpoint/2010/main" val="3843622176"/>
       </p:ext>
     </p:extLst>
   </p:cSld>
@@ -4603,7 +4604,7 @@
             <a:pPr algn="ctr"/>
             <a:r>
               <a:rPr lang="en-US" dirty="0"/>
-              <a:t>Disassociating Voter/Vote</a:t>
+              <a:t>Tallying Phase</a:t>
             </a:r>
           </a:p>
         </p:txBody>
@@ -4625,15 +4626,20 @@
           <a:p>
             <a:r>
               <a:rPr lang="en-US" dirty="0"/>
-              <a:t>Once the advisory validates the credentials, sends a request to the ballot server to initiate communications with the booth.</a:t>
-            </a:r>
-          </a:p>
-          <a:p>
-            <a:pPr lvl="1"/>
-            <a:r>
-              <a:rPr lang="en-US" dirty="0"/>
-              <a:t>Voter can now cast vote, but the ballot server does not know who the vote is coming from.</a:t>
-            </a:r>
+              <a:t>Vote is only tallied after the hash is verified</a:t>
+            </a:r>
+          </a:p>
+          <a:p>
+            <a:pPr marL="0" indent="0">
+              <a:buNone/>
+            </a:pPr>
+            <a:endParaRPr lang="en-US" dirty="0"/>
+          </a:p>
+          <a:p>
+            <a:pPr marL="0" indent="0">
+              <a:buNone/>
+            </a:pPr>
+            <a:endParaRPr lang="en-US" b="1" dirty="0"/>
           </a:p>
         </p:txBody>
       </p:sp>
@@ -4659,7 +4665,7 @@
     </p:spTree>
     <p:extLst>
       <p:ext uri="{BB962C8B-B14F-4D97-AF65-F5344CB8AC3E}">
-        <p14:creationId xmlns:p14="http://schemas.microsoft.com/office/powerpoint/2010/main" val="1492122553"/>
+        <p14:creationId xmlns:p14="http://schemas.microsoft.com/office/powerpoint/2010/main" val="279905248"/>
       </p:ext>
     </p:extLst>
   </p:cSld>
@@ -4704,7 +4710,7 @@
             <a:pPr algn="ctr"/>
             <a:r>
               <a:rPr lang="en-US" dirty="0"/>
-              <a:t>Proposed Encryption Method</a:t>
+              <a:t>Disassociating Voter/Vote</a:t>
             </a:r>
           </a:p>
         </p:txBody>
@@ -4726,25 +4732,15 @@
           <a:p>
             <a:r>
               <a:rPr lang="en-US" dirty="0"/>
-              <a:t>Symmetric Encryption on all channels</a:t>
+              <a:t>Once the advisory validates the credentials, the booth initiates communication with the ballot server</a:t>
             </a:r>
           </a:p>
           <a:p>
             <a:pPr lvl="1"/>
             <a:r>
               <a:rPr lang="en-US" dirty="0"/>
-              <a:t>AES</a:t>
-            </a:r>
-          </a:p>
-          <a:p>
-            <a:pPr lvl="1"/>
-            <a:r>
-              <a:rPr lang="en-US" dirty="0"/>
-              <a:t>Hash encrypted message</a:t>
-            </a:r>
-          </a:p>
-          <a:p>
-            <a:endParaRPr lang="en-US" dirty="0"/>
+              <a:t>Voter can now cast vote, but the ballot server does not know who the vote is coming from.</a:t>
+            </a:r>
           </a:p>
         </p:txBody>
       </p:sp>
@@ -4770,7 +4766,7 @@
     </p:spTree>
     <p:extLst>
       <p:ext uri="{BB962C8B-B14F-4D97-AF65-F5344CB8AC3E}">
-        <p14:creationId xmlns:p14="http://schemas.microsoft.com/office/powerpoint/2010/main" val="1579761944"/>
+        <p14:creationId xmlns:p14="http://schemas.microsoft.com/office/powerpoint/2010/main" val="1492122553"/>
       </p:ext>
     </p:extLst>
   </p:cSld>
@@ -4815,7 +4811,7 @@
             <a:pPr algn="ctr"/>
             <a:r>
               <a:rPr lang="en-US" dirty="0"/>
-              <a:t>Current Encryption Methods </a:t>
+              <a:t>Proposed Encryption Method</a:t>
             </a:r>
           </a:p>
         </p:txBody>
@@ -4837,51 +4833,25 @@
           <a:p>
             <a:r>
               <a:rPr lang="en-US" dirty="0"/>
-              <a:t>Homomorphic encryption:</a:t>
+              <a:t>Symmetric Encryption on all channels</a:t>
             </a:r>
           </a:p>
           <a:p>
             <a:pPr lvl="1"/>
             <a:r>
-              <a:rPr lang="en-US" dirty="0" err="1"/>
-              <a:t>Enc</a:t>
-            </a:r>
-            <a:r>
               <a:rPr lang="en-US" dirty="0"/>
-              <a:t>(v1) *...* </a:t>
-            </a:r>
-            <a:r>
-              <a:rPr lang="en-US" dirty="0" err="1"/>
-              <a:t>Enc</a:t>
-            </a:r>
+              <a:t>AES</a:t>
+            </a:r>
+          </a:p>
+          <a:p>
+            <a:pPr lvl="1"/>
             <a:r>
               <a:rPr lang="en-US" dirty="0"/>
-              <a:t>(</a:t>
-            </a:r>
-            <a:r>
-              <a:rPr lang="en-US" dirty="0" err="1"/>
-              <a:t>vn</a:t>
-            </a:r>
-            <a:r>
-              <a:rPr lang="en-US" dirty="0"/>
-              <a:t>) = </a:t>
-            </a:r>
-            <a:r>
-              <a:rPr lang="en-US" dirty="0" err="1"/>
-              <a:t>Enc</a:t>
-            </a:r>
-            <a:r>
-              <a:rPr lang="en-US" dirty="0"/>
-              <a:t>(v1 +...+ </a:t>
-            </a:r>
-            <a:r>
-              <a:rPr lang="en-US" dirty="0" err="1"/>
-              <a:t>vn</a:t>
-            </a:r>
-            <a:r>
-              <a:rPr lang="en-US" dirty="0"/>
-              <a:t>).</a:t>
-            </a:r>
+              <a:t>Hash encrypted message</a:t>
+            </a:r>
+          </a:p>
+          <a:p>
+            <a:endParaRPr lang="en-US" dirty="0"/>
           </a:p>
         </p:txBody>
       </p:sp>
@@ -4907,7 +4877,7 @@
     </p:spTree>
     <p:extLst>
       <p:ext uri="{BB962C8B-B14F-4D97-AF65-F5344CB8AC3E}">
-        <p14:creationId xmlns:p14="http://schemas.microsoft.com/office/powerpoint/2010/main" val="2900096873"/>
+        <p14:creationId xmlns:p14="http://schemas.microsoft.com/office/powerpoint/2010/main" val="1579761944"/>
       </p:ext>
     </p:extLst>
   </p:cSld>
@@ -5031,7 +5001,7 @@
             <a:pPr algn="ctr"/>
             <a:r>
               <a:rPr lang="en-US" sz="1400" dirty="0"/>
-              <a:t>6. Cast Vote</a:t>
+              <a:t>5. Cast Vote</a:t>
             </a:r>
           </a:p>
         </p:txBody>
@@ -5133,14 +5103,14 @@
             <a:pPr algn="ctr"/>
             <a:r>
               <a:rPr lang="en-US" sz="1400" dirty="0"/>
-              <a:t>8. Tally Vote</a:t>
+              <a:t>7. Tally Vote</a:t>
             </a:r>
           </a:p>
           <a:p>
             <a:pPr algn="ctr"/>
             <a:r>
               <a:rPr lang="en-US" sz="1400" dirty="0"/>
-              <a:t>9. Close Communication</a:t>
+              <a:t>8. Close Communication</a:t>
             </a:r>
           </a:p>
         </p:txBody>
@@ -5281,17 +5251,16 @@
       </p:sp>
       <p:cxnSp>
         <p:nvCxnSpPr>
-          <p:cNvPr id="18" name="Connector: Curved 17"/>
+          <p:cNvPr id="21" name="Connector: Curved 20"/>
           <p:cNvCxnSpPr>
-            <a:stCxn id="6" idx="4"/>
-            <a:endCxn id="7" idx="6"/>
+            <a:stCxn id="5" idx="4"/>
           </p:cNvCxnSpPr>
           <p:nvPr/>
         </p:nvCxnSpPr>
         <p:spPr>
-          <a:xfrm rot="5400000">
-            <a:off x="7381103" y="3954167"/>
-            <a:ext cx="1521945" cy="1390136"/>
+          <a:xfrm rot="16200000" flipH="1">
+            <a:off x="2849415" y="3868546"/>
+            <a:ext cx="1398074" cy="1668164"/>
           </a:xfrm>
           <a:prstGeom prst="curvedConnector2">
             <a:avLst/>
@@ -5317,14 +5286,14 @@
       </p:cxnSp>
       <p:sp>
         <p:nvSpPr>
-          <p:cNvPr id="19" name="TextBox 18"/>
+          <p:cNvPr id="22" name="TextBox 21"/>
           <p:cNvSpPr txBox="1"/>
           <p:nvPr/>
         </p:nvSpPr>
         <p:spPr>
-          <a:xfrm rot="18019244">
-            <a:off x="7826691" y="4393509"/>
-            <a:ext cx="2150076" cy="307777"/>
+          <a:xfrm rot="2391888">
+            <a:off x="2809611" y="4707530"/>
+            <a:ext cx="2108886" cy="523220"/>
           </a:xfrm>
           <a:prstGeom prst="rect">
             <a:avLst/>
@@ -5339,72 +5308,7 @@
           <a:p>
             <a:r>
               <a:rPr lang="en-US" sz="1400" dirty="0"/>
-              <a:t>4. Ballot Request</a:t>
-            </a:r>
-          </a:p>
-        </p:txBody>
-      </p:sp>
-      <p:cxnSp>
-        <p:nvCxnSpPr>
-          <p:cNvPr id="21" name="Connector: Curved 20"/>
-          <p:cNvCxnSpPr>
-            <a:stCxn id="7" idx="2"/>
-            <a:endCxn id="5" idx="4"/>
-          </p:cNvCxnSpPr>
-          <p:nvPr/>
-        </p:nvCxnSpPr>
-        <p:spPr>
-          <a:xfrm rot="10800000">
-            <a:off x="2714370" y="4003592"/>
-            <a:ext cx="1668162" cy="1406617"/>
-          </a:xfrm>
-          <a:prstGeom prst="curvedConnector2">
-            <a:avLst/>
-          </a:prstGeom>
-          <a:ln>
-            <a:tailEnd type="triangle"/>
-          </a:ln>
-        </p:spPr>
-        <p:style>
-          <a:lnRef idx="2">
-            <a:schemeClr val="dk1"/>
-          </a:lnRef>
-          <a:fillRef idx="0">
-            <a:schemeClr val="dk1"/>
-          </a:fillRef>
-          <a:effectRef idx="1">
-            <a:schemeClr val="dk1"/>
-          </a:effectRef>
-          <a:fontRef idx="minor">
-            <a:schemeClr val="tx1"/>
-          </a:fontRef>
-        </p:style>
-      </p:cxnSp>
-      <p:sp>
-        <p:nvSpPr>
-          <p:cNvPr id="22" name="TextBox 21"/>
-          <p:cNvSpPr txBox="1"/>
-          <p:nvPr/>
-        </p:nvSpPr>
-        <p:spPr>
-          <a:xfrm rot="2391888">
-            <a:off x="2485349" y="4605192"/>
-            <a:ext cx="2108886" cy="307777"/>
-          </a:xfrm>
-          <a:prstGeom prst="rect">
-            <a:avLst/>
-          </a:prstGeom>
-          <a:noFill/>
-        </p:spPr>
-        <p:txBody>
-          <a:bodyPr wrap="square" rtlCol="0">
-            <a:spAutoFit/>
-          </a:bodyPr>
-          <a:lstStyle/>
-          <a:p>
-            <a:r>
-              <a:rPr lang="en-US" sz="1400" dirty="0"/>
-              <a:t>5. Initiate Communication</a:t>
+              <a:t>4. Initiate Communication</a:t>
             </a:r>
           </a:p>
         </p:txBody>
@@ -5455,8 +5359,8 @@
         </p:nvSpPr>
         <p:spPr>
           <a:xfrm rot="2410980">
-            <a:off x="1822418" y="5343250"/>
-            <a:ext cx="1891385" cy="307777"/>
+            <a:off x="2022915" y="5251075"/>
+            <a:ext cx="1891385" cy="523220"/>
           </a:xfrm>
           <a:prstGeom prst="rect">
             <a:avLst/>
@@ -5471,7 +5375,7 @@
           <a:p>
             <a:r>
               <a:rPr lang="en-US" sz="1400" dirty="0"/>
-              <a:t>7. Send Encrypted Vote</a:t>
+              <a:t>6. Send Encrypted Vote</a:t>
             </a:r>
           </a:p>
         </p:txBody>
@@ -5789,6 +5693,176 @@
     <p:extLst>
       <p:ext uri="{BB962C8B-B14F-4D97-AF65-F5344CB8AC3E}">
         <p14:creationId xmlns:p14="http://schemas.microsoft.com/office/powerpoint/2010/main" val="640905498"/>
+      </p:ext>
+    </p:extLst>
+  </p:cSld>
+  <p:clrMapOvr>
+    <a:masterClrMapping/>
+  </p:clrMapOvr>
+</p:sld>
+</file>
+
+<file path=ppt/slides/slide18.xml><?xml version="1.0" encoding="utf-8"?>
+<p:sld xmlns:a="http://schemas.openxmlformats.org/drawingml/2006/main" xmlns:r="http://schemas.openxmlformats.org/officeDocument/2006/relationships" xmlns:p="http://schemas.openxmlformats.org/presentationml/2006/main">
+  <p:cSld>
+    <p:spTree>
+      <p:nvGrpSpPr>
+        <p:cNvPr id="1" name=""/>
+        <p:cNvGrpSpPr/>
+        <p:nvPr/>
+      </p:nvGrpSpPr>
+      <p:grpSpPr>
+        <a:xfrm>
+          <a:off x="0" y="0"/>
+          <a:ext cx="0" cy="0"/>
+          <a:chOff x="0" y="0"/>
+          <a:chExt cx="0" cy="0"/>
+        </a:xfrm>
+      </p:grpSpPr>
+      <p:sp>
+        <p:nvSpPr>
+          <p:cNvPr id="2" name="Title 1"/>
+          <p:cNvSpPr>
+            <a:spLocks noGrp="1"/>
+          </p:cNvSpPr>
+          <p:nvPr>
+            <p:ph type="title"/>
+          </p:nvPr>
+        </p:nvSpPr>
+        <p:spPr/>
+        <p:txBody>
+          <a:bodyPr/>
+          <a:lstStyle/>
+          <a:p>
+            <a:pPr algn="ctr"/>
+            <a:r>
+              <a:rPr lang="en-US" dirty="0"/>
+              <a:t>Current Encryption Methods </a:t>
+            </a:r>
+          </a:p>
+        </p:txBody>
+      </p:sp>
+      <p:sp>
+        <p:nvSpPr>
+          <p:cNvPr id="3" name="Content Placeholder 2"/>
+          <p:cNvSpPr>
+            <a:spLocks noGrp="1"/>
+          </p:cNvSpPr>
+          <p:nvPr>
+            <p:ph idx="1"/>
+          </p:nvPr>
+        </p:nvSpPr>
+        <p:spPr/>
+        <p:txBody>
+          <a:bodyPr/>
+          <a:lstStyle/>
+          <a:p>
+            <a:r>
+              <a:rPr lang="en-US" dirty="0"/>
+              <a:t>Homomorphic encryption:</a:t>
+            </a:r>
+          </a:p>
+          <a:p>
+            <a:pPr lvl="1"/>
+            <a:r>
+              <a:rPr lang="en-US" dirty="0" err="1"/>
+              <a:t>Enc</a:t>
+            </a:r>
+            <a:r>
+              <a:rPr lang="en-US" dirty="0"/>
+              <a:t>(v1) *...* </a:t>
+            </a:r>
+            <a:r>
+              <a:rPr lang="en-US" dirty="0" err="1"/>
+              <a:t>Enc</a:t>
+            </a:r>
+            <a:r>
+              <a:rPr lang="en-US" dirty="0"/>
+              <a:t>(</a:t>
+            </a:r>
+            <a:r>
+              <a:rPr lang="en-US" dirty="0" err="1"/>
+              <a:t>vn</a:t>
+            </a:r>
+            <a:r>
+              <a:rPr lang="en-US" dirty="0"/>
+              <a:t>) = </a:t>
+            </a:r>
+            <a:r>
+              <a:rPr lang="en-US" dirty="0" err="1"/>
+              <a:t>Enc</a:t>
+            </a:r>
+            <a:r>
+              <a:rPr lang="en-US" dirty="0"/>
+              <a:t>(v1 +...+ </a:t>
+            </a:r>
+            <a:r>
+              <a:rPr lang="en-US" dirty="0" err="1"/>
+              <a:t>vn</a:t>
+            </a:r>
+            <a:r>
+              <a:rPr lang="en-US" dirty="0"/>
+              <a:t>).</a:t>
+            </a:r>
+          </a:p>
+          <a:p>
+            <a:endParaRPr lang="en-US" dirty="0"/>
+          </a:p>
+        </p:txBody>
+      </p:sp>
+      <p:sp>
+        <p:nvSpPr>
+          <p:cNvPr id="4" name="Footer Placeholder 3"/>
+          <p:cNvSpPr>
+            <a:spLocks noGrp="1"/>
+          </p:cNvSpPr>
+          <p:nvPr>
+            <p:ph type="ftr" sz="quarter" idx="11"/>
+          </p:nvPr>
+        </p:nvSpPr>
+        <p:spPr/>
+        <p:txBody>
+          <a:bodyPr/>
+          <a:lstStyle/>
+          <a:p>
+            <a:endParaRPr lang="en-US"/>
+          </a:p>
+        </p:txBody>
+      </p:sp>
+      <p:pic>
+        <p:nvPicPr>
+          <p:cNvPr id="5" name="Picture 4"/>
+          <p:cNvPicPr>
+            <a:picLocks noChangeAspect="1"/>
+          </p:cNvPicPr>
+          <p:nvPr/>
+        </p:nvPicPr>
+        <p:blipFill>
+          <a:blip r:embed="rId2">
+            <a:extLst>
+              <a:ext uri="{28A0092B-C50C-407E-A947-70E740481C1C}">
+                <a14:useLocalDpi xmlns:a14="http://schemas.microsoft.com/office/drawing/2010/main" val="0"/>
+              </a:ext>
+            </a:extLst>
+          </a:blip>
+          <a:stretch>
+            <a:fillRect/>
+          </a:stretch>
+        </p:blipFill>
+        <p:spPr>
+          <a:xfrm>
+            <a:off x="3330057" y="3528990"/>
+            <a:ext cx="5684285" cy="2631403"/>
+          </a:xfrm>
+          <a:prstGeom prst="rect">
+            <a:avLst/>
+          </a:prstGeom>
+        </p:spPr>
+      </p:pic>
+    </p:spTree>
+    <p:extLst>
+      <p:ext uri="{BB962C8B-B14F-4D97-AF65-F5344CB8AC3E}">
+        <p14:creationId xmlns:p14="http://schemas.microsoft.com/office/powerpoint/2010/main" val="2900096873"/>
       </p:ext>
     </p:extLst>
   </p:cSld>
@@ -5975,7 +6049,7 @@
             <a:pPr algn="ctr"/>
             <a:r>
               <a:rPr lang="en-US" dirty="0"/>
-              <a:t>Problems</a:t>
+              <a:t>Motivation</a:t>
             </a:r>
           </a:p>
         </p:txBody>
@@ -5990,44 +6064,50 @@
             <p:ph idx="1"/>
           </p:nvPr>
         </p:nvSpPr>
-        <p:spPr/>
+        <p:spPr>
+          <a:xfrm>
+            <a:off x="838200" y="1690688"/>
+            <a:ext cx="10515600" cy="4486275"/>
+          </a:xfrm>
+        </p:spPr>
         <p:txBody>
           <a:bodyPr/>
           <a:lstStyle/>
           <a:p>
             <a:r>
               <a:rPr lang="en-US" dirty="0"/>
-              <a:t>Votes can be altered</a:t>
+              <a:t>Eliminate human error in tallying</a:t>
             </a:r>
           </a:p>
           <a:p>
             <a:r>
               <a:rPr lang="en-US" dirty="0"/>
-              <a:t>Voters may vote more than once</a:t>
+              <a:t>Cost-effectiveness</a:t>
             </a:r>
           </a:p>
           <a:p>
             <a:r>
               <a:rPr lang="en-US" dirty="0"/>
-              <a:t>Voter Impersonation</a:t>
+              <a:t>Increases voter confidence</a:t>
             </a:r>
           </a:p>
           <a:p>
             <a:r>
               <a:rPr lang="en-US" dirty="0"/>
-              <a:t>Tallying can be altered</a:t>
-            </a:r>
-          </a:p>
-          <a:p>
+              <a:t>Potentially increase voter turnout</a:t>
+            </a:r>
+          </a:p>
+          <a:p>
+            <a:pPr lvl="1"/>
             <a:r>
               <a:rPr lang="en-US" dirty="0"/>
-              <a:t>Votes can be tied to voters</a:t>
+              <a:t>Internet-based voting</a:t>
             </a:r>
           </a:p>
           <a:p>
             <a:r>
               <a:rPr lang="en-US" dirty="0"/>
-              <a:t>Erroneous Communication</a:t>
+              <a:t>Immediate Results</a:t>
             </a:r>
           </a:p>
         </p:txBody>
@@ -6054,7 +6134,7 @@
     </p:spTree>
     <p:extLst>
       <p:ext uri="{BB962C8B-B14F-4D97-AF65-F5344CB8AC3E}">
-        <p14:creationId xmlns:p14="http://schemas.microsoft.com/office/powerpoint/2010/main" val="3214018132"/>
+        <p14:creationId xmlns:p14="http://schemas.microsoft.com/office/powerpoint/2010/main" val="2952968248"/>
       </p:ext>
     </p:extLst>
   </p:cSld>
@@ -6099,6 +6179,130 @@
             <a:pPr algn="ctr"/>
             <a:r>
               <a:rPr lang="en-US" dirty="0"/>
+              <a:t>Problems</a:t>
+            </a:r>
+          </a:p>
+        </p:txBody>
+      </p:sp>
+      <p:sp>
+        <p:nvSpPr>
+          <p:cNvPr id="3" name="Content Placeholder 2"/>
+          <p:cNvSpPr>
+            <a:spLocks noGrp="1"/>
+          </p:cNvSpPr>
+          <p:nvPr>
+            <p:ph idx="1"/>
+          </p:nvPr>
+        </p:nvSpPr>
+        <p:spPr/>
+        <p:txBody>
+          <a:bodyPr/>
+          <a:lstStyle/>
+          <a:p>
+            <a:r>
+              <a:rPr lang="en-US" dirty="0"/>
+              <a:t>Votes can be altered</a:t>
+            </a:r>
+          </a:p>
+          <a:p>
+            <a:r>
+              <a:rPr lang="en-US" dirty="0"/>
+              <a:t>Voters may vote more than once</a:t>
+            </a:r>
+          </a:p>
+          <a:p>
+            <a:r>
+              <a:rPr lang="en-US" dirty="0"/>
+              <a:t>Voter Impersonation</a:t>
+            </a:r>
+          </a:p>
+          <a:p>
+            <a:r>
+              <a:rPr lang="en-US" dirty="0"/>
+              <a:t>Tallying can be altered</a:t>
+            </a:r>
+          </a:p>
+          <a:p>
+            <a:r>
+              <a:rPr lang="en-US" dirty="0"/>
+              <a:t>Votes can be tied to voters</a:t>
+            </a:r>
+          </a:p>
+          <a:p>
+            <a:r>
+              <a:rPr lang="en-US" dirty="0"/>
+              <a:t>Erroneous Communication</a:t>
+            </a:r>
+          </a:p>
+        </p:txBody>
+      </p:sp>
+      <p:sp>
+        <p:nvSpPr>
+          <p:cNvPr id="4" name="Footer Placeholder 3"/>
+          <p:cNvSpPr>
+            <a:spLocks noGrp="1"/>
+          </p:cNvSpPr>
+          <p:nvPr>
+            <p:ph type="ftr" sz="quarter" idx="11"/>
+          </p:nvPr>
+        </p:nvSpPr>
+        <p:spPr/>
+        <p:txBody>
+          <a:bodyPr/>
+          <a:lstStyle/>
+          <a:p>
+            <a:endParaRPr lang="en-US"/>
+          </a:p>
+        </p:txBody>
+      </p:sp>
+    </p:spTree>
+    <p:extLst>
+      <p:ext uri="{BB962C8B-B14F-4D97-AF65-F5344CB8AC3E}">
+        <p14:creationId xmlns:p14="http://schemas.microsoft.com/office/powerpoint/2010/main" val="3214018132"/>
+      </p:ext>
+    </p:extLst>
+  </p:cSld>
+  <p:clrMapOvr>
+    <a:masterClrMapping/>
+  </p:clrMapOvr>
+</p:sld>
+</file>
+
+<file path=ppt/slides/slide5.xml><?xml version="1.0" encoding="utf-8"?>
+<p:sld xmlns:a="http://schemas.openxmlformats.org/drawingml/2006/main" xmlns:r="http://schemas.openxmlformats.org/officeDocument/2006/relationships" xmlns:p="http://schemas.openxmlformats.org/presentationml/2006/main">
+  <p:cSld>
+    <p:spTree>
+      <p:nvGrpSpPr>
+        <p:cNvPr id="1" name=""/>
+        <p:cNvGrpSpPr/>
+        <p:nvPr/>
+      </p:nvGrpSpPr>
+      <p:grpSpPr>
+        <a:xfrm>
+          <a:off x="0" y="0"/>
+          <a:ext cx="0" cy="0"/>
+          <a:chOff x="0" y="0"/>
+          <a:chExt cx="0" cy="0"/>
+        </a:xfrm>
+      </p:grpSpPr>
+      <p:sp>
+        <p:nvSpPr>
+          <p:cNvPr id="2" name="Title 1"/>
+          <p:cNvSpPr>
+            <a:spLocks noGrp="1"/>
+          </p:cNvSpPr>
+          <p:nvPr>
+            <p:ph type="title"/>
+          </p:nvPr>
+        </p:nvSpPr>
+        <p:spPr/>
+        <p:txBody>
+          <a:bodyPr/>
+          <a:lstStyle/>
+          <a:p>
+            <a:pPr algn="ctr"/>
+            <a:r>
+              <a:rPr lang="en-US" dirty="0"/>
               <a:t>System Security Requirements</a:t>
             </a:r>
           </a:p>
@@ -6162,7 +6366,7 @@
             </a:r>
             <a:r>
               <a:rPr lang="en-US" dirty="0"/>
-              <a:t>: Voters should not be able to be modified without detection</a:t>
+              <a:t>: Votes should not be able to be modified without detection</a:t>
             </a:r>
           </a:p>
           <a:p>
@@ -6433,7 +6637,7 @@
 </p:sld>
 </file>
 
-<file path=ppt/slides/slide5.xml><?xml version="1.0" encoding="utf-8"?>
+<file path=ppt/slides/slide6.xml><?xml version="1.0" encoding="utf-8"?>
 <p:sld xmlns:a="http://schemas.openxmlformats.org/drawingml/2006/main" xmlns:r="http://schemas.openxmlformats.org/officeDocument/2006/relationships" xmlns:p="http://schemas.openxmlformats.org/presentationml/2006/main">
   <p:cSld>
     <p:spTree>
@@ -6799,154 +7003,6 @@
 </p:sld>
 </file>
 
-<file path=ppt/slides/slide6.xml><?xml version="1.0" encoding="utf-8"?>
-<p:sld xmlns:a="http://schemas.openxmlformats.org/drawingml/2006/main" xmlns:r="http://schemas.openxmlformats.org/officeDocument/2006/relationships" xmlns:p="http://schemas.openxmlformats.org/presentationml/2006/main">
-  <p:cSld>
-    <p:spTree>
-      <p:nvGrpSpPr>
-        <p:cNvPr id="1" name=""/>
-        <p:cNvGrpSpPr/>
-        <p:nvPr/>
-      </p:nvGrpSpPr>
-      <p:grpSpPr>
-        <a:xfrm>
-          <a:off x="0" y="0"/>
-          <a:ext cx="0" cy="0"/>
-          <a:chOff x="0" y="0"/>
-          <a:chExt cx="0" cy="0"/>
-        </a:xfrm>
-      </p:grpSpPr>
-      <p:sp>
-        <p:nvSpPr>
-          <p:cNvPr id="2" name="Title 1"/>
-          <p:cNvSpPr>
-            <a:spLocks noGrp="1"/>
-          </p:cNvSpPr>
-          <p:nvPr>
-            <p:ph type="title"/>
-          </p:nvPr>
-        </p:nvSpPr>
-        <p:spPr/>
-        <p:txBody>
-          <a:bodyPr/>
-          <a:lstStyle/>
-          <a:p>
-            <a:pPr algn="ctr"/>
-            <a:r>
-              <a:rPr lang="en-US" dirty="0"/>
-              <a:t>Four Stage of Secure Voting</a:t>
-            </a:r>
-          </a:p>
-        </p:txBody>
-      </p:sp>
-      <p:sp>
-        <p:nvSpPr>
-          <p:cNvPr id="3" name="Content Placeholder 2"/>
-          <p:cNvSpPr>
-            <a:spLocks noGrp="1"/>
-          </p:cNvSpPr>
-          <p:nvPr>
-            <p:ph idx="1"/>
-          </p:nvPr>
-        </p:nvSpPr>
-        <p:spPr/>
-        <p:txBody>
-          <a:bodyPr/>
-          <a:lstStyle/>
-          <a:p>
-            <a:pPr marL="514350" indent="-514350">
-              <a:buFont typeface="+mj-lt"/>
-              <a:buAutoNum type="arabicPeriod"/>
-            </a:pPr>
-            <a:r>
-              <a:rPr lang="en-US" b="1" i="1" dirty="0"/>
-              <a:t>Registration Phase</a:t>
-            </a:r>
-            <a:r>
-              <a:rPr lang="en-US" dirty="0"/>
-              <a:t> – Prior to election, voters will have to prove that they are eligible to vote and voter credentials are stored in a registration database.</a:t>
-            </a:r>
-          </a:p>
-          <a:p>
-            <a:pPr marL="514350" indent="-514350">
-              <a:buFont typeface="+mj-lt"/>
-              <a:buAutoNum type="arabicPeriod"/>
-            </a:pPr>
-            <a:r>
-              <a:rPr lang="en-US" b="1" i="1" dirty="0"/>
-              <a:t>Validation Phase</a:t>
-            </a:r>
-            <a:r>
-              <a:rPr lang="en-US" dirty="0"/>
-              <a:t> – When the user goes to vote we have to check that their credentials are valid and have not yet voted. </a:t>
-            </a:r>
-          </a:p>
-          <a:p>
-            <a:pPr marL="514350" indent="-514350">
-              <a:buFont typeface="+mj-lt"/>
-              <a:buAutoNum type="arabicPeriod"/>
-            </a:pPr>
-            <a:r>
-              <a:rPr lang="en-US" b="1" i="1" dirty="0"/>
-              <a:t>Vote Casting Phase</a:t>
-            </a:r>
-            <a:r>
-              <a:rPr lang="en-US" dirty="0"/>
-              <a:t> – Voters cast their vote and sent to the tallying database.</a:t>
-            </a:r>
-          </a:p>
-          <a:p>
-            <a:pPr marL="514350" indent="-514350">
-              <a:buFont typeface="+mj-lt"/>
-              <a:buAutoNum type="arabicPeriod"/>
-            </a:pPr>
-            <a:r>
-              <a:rPr lang="en-US" b="1" i="1" dirty="0"/>
-              <a:t>Tallying Phase</a:t>
-            </a:r>
-            <a:r>
-              <a:rPr lang="en-US" dirty="0"/>
-              <a:t> – Votes are tallied quickly and accurately </a:t>
-            </a:r>
-            <a:endParaRPr lang="en-US" b="1" i="1" dirty="0"/>
-          </a:p>
-          <a:p>
-            <a:endParaRPr lang="en-US" b="1" i="1" dirty="0"/>
-          </a:p>
-        </p:txBody>
-      </p:sp>
-      <p:sp>
-        <p:nvSpPr>
-          <p:cNvPr id="4" name="Footer Placeholder 3"/>
-          <p:cNvSpPr>
-            <a:spLocks noGrp="1"/>
-          </p:cNvSpPr>
-          <p:nvPr>
-            <p:ph type="ftr" sz="quarter" idx="11"/>
-          </p:nvPr>
-        </p:nvSpPr>
-        <p:spPr/>
-        <p:txBody>
-          <a:bodyPr/>
-          <a:lstStyle/>
-          <a:p>
-            <a:endParaRPr lang="en-US"/>
-          </a:p>
-        </p:txBody>
-      </p:sp>
-    </p:spTree>
-    <p:extLst>
-      <p:ext uri="{BB962C8B-B14F-4D97-AF65-F5344CB8AC3E}">
-        <p14:creationId xmlns:p14="http://schemas.microsoft.com/office/powerpoint/2010/main" val="3355951266"/>
-      </p:ext>
-    </p:extLst>
-  </p:cSld>
-  <p:clrMapOvr>
-    <a:masterClrMapping/>
-  </p:clrMapOvr>
-</p:sld>
-</file>
-
 <file path=ppt/slides/slide7.xml><?xml version="1.0" encoding="utf-8"?>
 <p:sld xmlns:a="http://schemas.openxmlformats.org/drawingml/2006/main" xmlns:r="http://schemas.openxmlformats.org/officeDocument/2006/relationships" xmlns:p="http://schemas.openxmlformats.org/presentationml/2006/main">
   <p:cSld>
@@ -6982,39 +7038,84 @@
             <a:pPr algn="ctr"/>
             <a:r>
               <a:rPr lang="en-US" dirty="0"/>
+              <a:t>Four Stage of Secure Voting</a:t>
+            </a:r>
+          </a:p>
+        </p:txBody>
+      </p:sp>
+      <p:sp>
+        <p:nvSpPr>
+          <p:cNvPr id="3" name="Content Placeholder 2"/>
+          <p:cNvSpPr>
+            <a:spLocks noGrp="1"/>
+          </p:cNvSpPr>
+          <p:nvPr>
+            <p:ph idx="1"/>
+          </p:nvPr>
+        </p:nvSpPr>
+        <p:spPr/>
+        <p:txBody>
+          <a:bodyPr/>
+          <a:lstStyle/>
+          <a:p>
+            <a:pPr marL="514350" indent="-514350">
+              <a:buFont typeface="+mj-lt"/>
+              <a:buAutoNum type="arabicPeriod"/>
+            </a:pPr>
+            <a:r>
+              <a:rPr lang="en-US" b="1" i="1" dirty="0"/>
               <a:t>Registration Phase</a:t>
             </a:r>
-          </a:p>
-        </p:txBody>
-      </p:sp>
-      <p:sp>
-        <p:nvSpPr>
-          <p:cNvPr id="3" name="Content Placeholder 2"/>
-          <p:cNvSpPr>
-            <a:spLocks noGrp="1"/>
-          </p:cNvSpPr>
-          <p:nvPr>
-            <p:ph idx="1"/>
-          </p:nvPr>
-        </p:nvSpPr>
-        <p:spPr/>
-        <p:txBody>
-          <a:bodyPr/>
-          <a:lstStyle/>
-          <a:p>
             <a:r>
               <a:rPr lang="en-US" dirty="0"/>
-              <a:t>Done before the election.</a:t>
-            </a:r>
-          </a:p>
-          <a:p>
+              <a:t> – Prior to election, voters will have to prove that they are eligible to vote and voter credentials are stored in a registration database.</a:t>
+            </a:r>
+          </a:p>
+          <a:p>
+            <a:pPr marL="514350" indent="-514350">
+              <a:buFont typeface="+mj-lt"/>
+              <a:buAutoNum type="arabicPeriod"/>
+            </a:pPr>
+            <a:r>
+              <a:rPr lang="en-US" b="1" i="1" dirty="0"/>
+              <a:t>Validation Phase</a:t>
+            </a:r>
             <a:r>
               <a:rPr lang="en-US" dirty="0"/>
-              <a:t>Once a voter is considered eligible to vote their credentials are stored in a registration server database. </a:t>
-            </a:r>
-          </a:p>
-          <a:p>
-            <a:endParaRPr lang="en-US" dirty="0"/>
+              <a:t> – When the user goes to vote we have to check that their credentials are valid and have not yet voted. </a:t>
+            </a:r>
+          </a:p>
+          <a:p>
+            <a:pPr marL="514350" indent="-514350">
+              <a:buFont typeface="+mj-lt"/>
+              <a:buAutoNum type="arabicPeriod"/>
+            </a:pPr>
+            <a:r>
+              <a:rPr lang="en-US" b="1" i="1" dirty="0"/>
+              <a:t>Vote Casting Phase</a:t>
+            </a:r>
+            <a:r>
+              <a:rPr lang="en-US" dirty="0"/>
+              <a:t> – Voters cast their vote and sent to the tallying database.</a:t>
+            </a:r>
+          </a:p>
+          <a:p>
+            <a:pPr marL="514350" indent="-514350">
+              <a:buFont typeface="+mj-lt"/>
+              <a:buAutoNum type="arabicPeriod"/>
+            </a:pPr>
+            <a:r>
+              <a:rPr lang="en-US" b="1" i="1" dirty="0"/>
+              <a:t>Tallying Phase</a:t>
+            </a:r>
+            <a:r>
+              <a:rPr lang="en-US" dirty="0"/>
+              <a:t> – Votes are tallied quickly and accurately </a:t>
+            </a:r>
+            <a:endParaRPr lang="en-US" b="1" i="1" dirty="0"/>
+          </a:p>
+          <a:p>
+            <a:endParaRPr lang="en-US" b="1" i="1" dirty="0"/>
           </a:p>
         </p:txBody>
       </p:sp>
@@ -7040,7 +7141,7 @@
     </p:spTree>
     <p:extLst>
       <p:ext uri="{BB962C8B-B14F-4D97-AF65-F5344CB8AC3E}">
-        <p14:creationId xmlns:p14="http://schemas.microsoft.com/office/powerpoint/2010/main" val="402796579"/>
+        <p14:creationId xmlns:p14="http://schemas.microsoft.com/office/powerpoint/2010/main" val="3355951266"/>
       </p:ext>
     </p:extLst>
   </p:cSld>
@@ -7085,7 +7186,7 @@
             <a:pPr algn="ctr"/>
             <a:r>
               <a:rPr lang="en-US" dirty="0"/>
-              <a:t>Validation Phase</a:t>
+              <a:t>Registration Phase</a:t>
             </a:r>
           </a:p>
         </p:txBody>
@@ -7107,35 +7208,17 @@
           <a:p>
             <a:r>
               <a:rPr lang="en-US" dirty="0"/>
-              <a:t>The user will enter their credentials which is checked against the database.</a:t>
+              <a:t>Done before the election.</a:t>
             </a:r>
           </a:p>
           <a:p>
             <a:r>
               <a:rPr lang="en-US" dirty="0"/>
-              <a:t> The database is a blockchain.</a:t>
-            </a:r>
-          </a:p>
-          <a:p>
-            <a:pPr lvl="1"/>
-            <a:r>
-              <a:rPr lang="en-US" dirty="0"/>
-              <a:t>De-centralized database.</a:t>
-            </a:r>
-          </a:p>
-          <a:p>
-            <a:pPr lvl="1"/>
-            <a:r>
-              <a:rPr lang="en-US" dirty="0"/>
-              <a:t>Everyone can read from the blockchain, only authorized users can write</a:t>
-            </a:r>
-          </a:p>
-          <a:p>
-            <a:pPr lvl="1"/>
-            <a:r>
-              <a:rPr lang="en-US" dirty="0"/>
-              <a:t>All previous writes are stored in the blockchain</a:t>
-            </a:r>
+              <a:t>Once a voter is considered eligible to vote their credentials are stored in a registration server database. </a:t>
+            </a:r>
+          </a:p>
+          <a:p>
+            <a:endParaRPr lang="en-US" dirty="0"/>
           </a:p>
         </p:txBody>
       </p:sp>
@@ -7161,7 +7244,7 @@
     </p:spTree>
     <p:extLst>
       <p:ext uri="{BB962C8B-B14F-4D97-AF65-F5344CB8AC3E}">
-        <p14:creationId xmlns:p14="http://schemas.microsoft.com/office/powerpoint/2010/main" val="2425849277"/>
+        <p14:creationId xmlns:p14="http://schemas.microsoft.com/office/powerpoint/2010/main" val="402796579"/>
       </p:ext>
     </p:extLst>
   </p:cSld>
@@ -7206,7 +7289,7 @@
             <a:pPr algn="ctr"/>
             <a:r>
               <a:rPr lang="en-US" dirty="0"/>
-              <a:t>Vote Casting Phase</a:t>
+              <a:t>Validation Phase</a:t>
             </a:r>
           </a:p>
         </p:txBody>
@@ -7228,20 +7311,35 @@
           <a:p>
             <a:r>
               <a:rPr lang="en-US" dirty="0"/>
-              <a:t>Votes are sent over an encrypted channel</a:t>
+              <a:t>The user will enter their credentials which is checked against the database.</a:t>
             </a:r>
           </a:p>
           <a:p>
             <a:r>
               <a:rPr lang="en-US" dirty="0"/>
-              <a:t>Encrypted Votes are hashed.</a:t>
-            </a:r>
-          </a:p>
-          <a:p>
-            <a:pPr marL="0" indent="0">
-              <a:buNone/>
-            </a:pPr>
-            <a:endParaRPr lang="en-US" b="1" dirty="0"/>
+              <a:t> The database is a blockchain.</a:t>
+            </a:r>
+          </a:p>
+          <a:p>
+            <a:pPr lvl="1"/>
+            <a:r>
+              <a:rPr lang="en-US" dirty="0"/>
+              <a:t>De-centralized database.</a:t>
+            </a:r>
+          </a:p>
+          <a:p>
+            <a:pPr lvl="1"/>
+            <a:r>
+              <a:rPr lang="en-US" dirty="0"/>
+              <a:t>Everyone can read from the blockchain, only authorized users can write</a:t>
+            </a:r>
+          </a:p>
+          <a:p>
+            <a:pPr lvl="1"/>
+            <a:r>
+              <a:rPr lang="en-US" dirty="0"/>
+              <a:t>All previous writes are stored in the blockchain</a:t>
+            </a:r>
           </a:p>
         </p:txBody>
       </p:sp>
@@ -7267,7 +7365,7 @@
     </p:spTree>
     <p:extLst>
       <p:ext uri="{BB962C8B-B14F-4D97-AF65-F5344CB8AC3E}">
-        <p14:creationId xmlns:p14="http://schemas.microsoft.com/office/powerpoint/2010/main" val="3843622176"/>
+        <p14:creationId xmlns:p14="http://schemas.microsoft.com/office/powerpoint/2010/main" val="2425849277"/>
       </p:ext>
     </p:extLst>
   </p:cSld>

</xml_diff>